<commit_message>
feat: Dynamic system integrated
</commit_message>
<xml_diff>
--- a/C班課題発表.pptx
+++ b/C班課題発表.pptx
@@ -108,6 +108,11 @@
       </a:defRPr>
     </a:lvl9pPr>
   </p:defaultTextStyle>
+  <p:extLst>
+    <p:ext uri="{EFAFB233-063F-42B5-8137-9DF3F51BA10A}">
+      <p15:sldGuideLst xmlns:p15="http://schemas.microsoft.com/office/powerpoint/2012/main"/>
+    </p:ext>
+  </p:extLst>
 </p:presentation>
 </file>
 
@@ -258,7 +263,7 @@
           <a:p>
             <a:fld id="{63D78AC7-0EAF-473A-A543-7C34B7770BC7}" type="datetimeFigureOut">
               <a:rPr kumimoji="1" lang="ja-JP" altLang="en-US" smtClean="0"/>
-              <a:t>2025/10/15</a:t>
+              <a:t>2025/11/5</a:t>
             </a:fld>
             <a:endParaRPr kumimoji="1" lang="ja-JP" altLang="en-US"/>
           </a:p>
@@ -488,7 +493,7 @@
           <a:p>
             <a:fld id="{63D78AC7-0EAF-473A-A543-7C34B7770BC7}" type="datetimeFigureOut">
               <a:rPr kumimoji="1" lang="ja-JP" altLang="en-US" smtClean="0"/>
-              <a:t>2025/10/15</a:t>
+              <a:t>2025/11/5</a:t>
             </a:fld>
             <a:endParaRPr kumimoji="1" lang="ja-JP" altLang="en-US"/>
           </a:p>
@@ -728,7 +733,7 @@
           <a:p>
             <a:fld id="{63D78AC7-0EAF-473A-A543-7C34B7770BC7}" type="datetimeFigureOut">
               <a:rPr kumimoji="1" lang="ja-JP" altLang="en-US" smtClean="0"/>
-              <a:t>2025/10/15</a:t>
+              <a:t>2025/11/5</a:t>
             </a:fld>
             <a:endParaRPr kumimoji="1" lang="ja-JP" altLang="en-US"/>
           </a:p>
@@ -958,7 +963,7 @@
           <a:p>
             <a:fld id="{63D78AC7-0EAF-473A-A543-7C34B7770BC7}" type="datetimeFigureOut">
               <a:rPr kumimoji="1" lang="ja-JP" altLang="en-US" smtClean="0"/>
-              <a:t>2025/10/15</a:t>
+              <a:t>2025/11/5</a:t>
             </a:fld>
             <a:endParaRPr kumimoji="1" lang="ja-JP" altLang="en-US"/>
           </a:p>
@@ -1233,7 +1238,7 @@
           <a:p>
             <a:fld id="{63D78AC7-0EAF-473A-A543-7C34B7770BC7}" type="datetimeFigureOut">
               <a:rPr kumimoji="1" lang="ja-JP" altLang="en-US" smtClean="0"/>
-              <a:t>2025/10/15</a:t>
+              <a:t>2025/11/5</a:t>
             </a:fld>
             <a:endParaRPr kumimoji="1" lang="ja-JP" altLang="en-US"/>
           </a:p>
@@ -1562,7 +1567,7 @@
           <a:p>
             <a:fld id="{63D78AC7-0EAF-473A-A543-7C34B7770BC7}" type="datetimeFigureOut">
               <a:rPr kumimoji="1" lang="ja-JP" altLang="en-US" smtClean="0"/>
-              <a:t>2025/10/15</a:t>
+              <a:t>2025/11/5</a:t>
             </a:fld>
             <a:endParaRPr kumimoji="1" lang="ja-JP" altLang="en-US"/>
           </a:p>
@@ -2038,7 +2043,7 @@
           <a:p>
             <a:fld id="{63D78AC7-0EAF-473A-A543-7C34B7770BC7}" type="datetimeFigureOut">
               <a:rPr kumimoji="1" lang="ja-JP" altLang="en-US" smtClean="0"/>
-              <a:t>2025/10/15</a:t>
+              <a:t>2025/11/5</a:t>
             </a:fld>
             <a:endParaRPr kumimoji="1" lang="ja-JP" altLang="en-US"/>
           </a:p>
@@ -2179,7 +2184,7 @@
           <a:p>
             <a:fld id="{63D78AC7-0EAF-473A-A543-7C34B7770BC7}" type="datetimeFigureOut">
               <a:rPr kumimoji="1" lang="ja-JP" altLang="en-US" smtClean="0"/>
-              <a:t>2025/10/15</a:t>
+              <a:t>2025/11/5</a:t>
             </a:fld>
             <a:endParaRPr kumimoji="1" lang="ja-JP" altLang="en-US"/>
           </a:p>
@@ -2292,7 +2297,7 @@
           <a:p>
             <a:fld id="{63D78AC7-0EAF-473A-A543-7C34B7770BC7}" type="datetimeFigureOut">
               <a:rPr kumimoji="1" lang="ja-JP" altLang="en-US" smtClean="0"/>
-              <a:t>2025/10/15</a:t>
+              <a:t>2025/11/5</a:t>
             </a:fld>
             <a:endParaRPr kumimoji="1" lang="ja-JP" altLang="en-US"/>
           </a:p>
@@ -2635,7 +2640,7 @@
           <a:p>
             <a:fld id="{63D78AC7-0EAF-473A-A543-7C34B7770BC7}" type="datetimeFigureOut">
               <a:rPr kumimoji="1" lang="ja-JP" altLang="en-US" smtClean="0"/>
-              <a:t>2025/10/15</a:t>
+              <a:t>2025/11/5</a:t>
             </a:fld>
             <a:endParaRPr kumimoji="1" lang="ja-JP" altLang="en-US"/>
           </a:p>
@@ -2923,7 +2928,7 @@
           <a:p>
             <a:fld id="{63D78AC7-0EAF-473A-A543-7C34B7770BC7}" type="datetimeFigureOut">
               <a:rPr kumimoji="1" lang="ja-JP" altLang="en-US" smtClean="0"/>
-              <a:t>2025/10/15</a:t>
+              <a:t>2025/11/5</a:t>
             </a:fld>
             <a:endParaRPr kumimoji="1" lang="ja-JP" altLang="en-US"/>
           </a:p>
@@ -3196,7 +3201,7 @@
           <a:p>
             <a:fld id="{63D78AC7-0EAF-473A-A543-7C34B7770BC7}" type="datetimeFigureOut">
               <a:rPr kumimoji="1" lang="ja-JP" altLang="en-US" smtClean="0"/>
-              <a:t>2025/10/15</a:t>
+              <a:t>2025/11/5</a:t>
             </a:fld>
             <a:endParaRPr kumimoji="1" lang="ja-JP" altLang="en-US"/>
           </a:p>
@@ -4120,7 +4125,7 @@
         </p:blipFill>
         <p:spPr>
           <a:xfrm>
-            <a:off x="0" y="2510997"/>
+            <a:off x="0" y="2264109"/>
             <a:ext cx="12192000" cy="4064000"/>
           </a:xfrm>
           <a:prstGeom prst="rect">

</xml_diff>